<commit_message>
Included optional computing of the center of rotations
fbp_w_heighted_cors.m now allows computing the center of rotations from heights other than the top and bottom most slices. Manual updated.
</commit_message>
<xml_diff>
--- a/MATLAB implementation of filtered backprojection reconstruction for optical.pptx
+++ b/MATLAB implementation of filtered backprojection reconstruction for optical.pptx
@@ -5,7 +5,7 @@
     <p:sldMasterId id="2147483648" r:id="rId1"/>
   </p:sldMasterIdLst>
   <p:notesMasterIdLst>
-    <p:notesMasterId r:id="rId11"/>
+    <p:notesMasterId r:id="rId13"/>
   </p:notesMasterIdLst>
   <p:sldIdLst>
     <p:sldId id="256" r:id="rId2"/>
@@ -17,6 +17,8 @@
     <p:sldId id="261" r:id="rId8"/>
     <p:sldId id="262" r:id="rId9"/>
     <p:sldId id="264" r:id="rId10"/>
+    <p:sldId id="266" r:id="rId11"/>
+    <p:sldId id="265" r:id="rId12"/>
   </p:sldIdLst>
   <p:sldSz cx="12192000" cy="6858000"/>
   <p:notesSz cx="6858000" cy="9144000"/>
@@ -115,6 +117,11 @@
       </a:defRPr>
     </a:lvl9pPr>
   </p:defaultTextStyle>
+  <p:extLst>
+    <p:ext uri="{EFAFB233-063F-42B5-8137-9DF3F51BA10A}">
+      <p15:sldGuideLst xmlns:p15="http://schemas.microsoft.com/office/powerpoint/2012/main"/>
+    </p:ext>
+  </p:extLst>
 </p:presentation>
 </file>
 
@@ -200,7 +207,7 @@
           <a:p>
             <a:fld id="{9A2815DC-FCBD-410F-8322-D4580A8A5FF0}" type="datetimeFigureOut">
               <a:rPr lang="fi-FI" smtClean="0"/>
-              <a:t>20.3.2019</a:t>
+              <a:t>6.6.2019</a:t>
             </a:fld>
             <a:endParaRPr lang="fi-FI"/>
           </a:p>
@@ -552,6 +559,486 @@
 </p:notes>
 </file>
 
+<file path=ppt/notesSlides/notesSlide10.xml><?xml version="1.0" encoding="utf-8"?>
+<p:notes xmlns:a="http://schemas.openxmlformats.org/drawingml/2006/main" xmlns:r="http://schemas.openxmlformats.org/officeDocument/2006/relationships" xmlns:p="http://schemas.openxmlformats.org/presentationml/2006/main">
+  <p:cSld>
+    <p:spTree>
+      <p:nvGrpSpPr>
+        <p:cNvPr id="1" name=""/>
+        <p:cNvGrpSpPr/>
+        <p:nvPr/>
+      </p:nvGrpSpPr>
+      <p:grpSpPr>
+        <a:xfrm>
+          <a:off x="0" y="0"/>
+          <a:ext cx="0" cy="0"/>
+          <a:chOff x="0" y="0"/>
+          <a:chExt cx="0" cy="0"/>
+        </a:xfrm>
+      </p:grpSpPr>
+      <p:sp>
+        <p:nvSpPr>
+          <p:cNvPr id="2" name="Slide Image Placeholder 1"/>
+          <p:cNvSpPr>
+            <a:spLocks noGrp="1" noRot="1" noChangeAspect="1"/>
+          </p:cNvSpPr>
+          <p:nvPr>
+            <p:ph type="sldImg"/>
+          </p:nvPr>
+        </p:nvSpPr>
+        <p:spPr/>
+      </p:sp>
+      <p:sp>
+        <p:nvSpPr>
+          <p:cNvPr id="3" name="Notes Placeholder 2"/>
+          <p:cNvSpPr>
+            <a:spLocks noGrp="1"/>
+          </p:cNvSpPr>
+          <p:nvPr>
+            <p:ph type="body" idx="1"/>
+          </p:nvPr>
+        </p:nvSpPr>
+        <p:spPr/>
+        <p:txBody>
+          <a:bodyPr/>
+          <a:lstStyle/>
+          <a:p>
+            <a:r>
+              <a:rPr lang="fi-FI" dirty="0" smtClean="0"/>
+              <a:t>In </a:t>
+            </a:r>
+            <a:r>
+              <a:rPr lang="fi-FI" dirty="0" err="1" smtClean="0"/>
+              <a:t>the</a:t>
+            </a:r>
+            <a:r>
+              <a:rPr lang="fi-FI" dirty="0" smtClean="0"/>
+              <a:t> case of </a:t>
+            </a:r>
+            <a:r>
+              <a:rPr lang="fi-FI" dirty="0" err="1" smtClean="0"/>
+              <a:t>heighted</a:t>
+            </a:r>
+            <a:r>
+              <a:rPr lang="fi-FI" dirty="0" smtClean="0"/>
+              <a:t> </a:t>
+            </a:r>
+            <a:r>
+              <a:rPr lang="fi-FI" dirty="0" err="1" smtClean="0"/>
+              <a:t>CoRs</a:t>
+            </a:r>
+            <a:r>
+              <a:rPr lang="fi-FI" dirty="0" smtClean="0"/>
+              <a:t>,</a:t>
+            </a:r>
+            <a:r>
+              <a:rPr lang="fi-FI" baseline="0" dirty="0" smtClean="0"/>
+              <a:t> </a:t>
+            </a:r>
+            <a:r>
+              <a:rPr lang="fi-FI" baseline="0" dirty="0" err="1" smtClean="0"/>
+              <a:t>both</a:t>
+            </a:r>
+            <a:r>
+              <a:rPr lang="fi-FI" baseline="0" dirty="0" smtClean="0"/>
+              <a:t> </a:t>
+            </a:r>
+            <a:r>
+              <a:rPr lang="fi-FI" baseline="0" dirty="0" err="1" smtClean="0"/>
+              <a:t>the</a:t>
+            </a:r>
+            <a:r>
+              <a:rPr lang="fi-FI" baseline="0" dirty="0" smtClean="0"/>
+              <a:t> </a:t>
+            </a:r>
+            <a:r>
+              <a:rPr lang="fi-FI" baseline="0" dirty="0" err="1" smtClean="0"/>
+              <a:t>actual</a:t>
+            </a:r>
+            <a:r>
+              <a:rPr lang="fi-FI" baseline="0" dirty="0" smtClean="0"/>
+              <a:t> </a:t>
+            </a:r>
+            <a:r>
+              <a:rPr lang="fi-FI" baseline="0" dirty="0" err="1" smtClean="0"/>
+              <a:t>CoR</a:t>
+            </a:r>
+            <a:r>
+              <a:rPr lang="fi-FI" baseline="0" dirty="0" smtClean="0"/>
+              <a:t> </a:t>
+            </a:r>
+            <a:r>
+              <a:rPr lang="fi-FI" baseline="0" dirty="0" err="1" smtClean="0"/>
+              <a:t>from</a:t>
+            </a:r>
+            <a:r>
+              <a:rPr lang="fi-FI" baseline="0" dirty="0" smtClean="0"/>
+              <a:t> </a:t>
+            </a:r>
+            <a:r>
+              <a:rPr lang="fi-FI" baseline="0" dirty="0" err="1" smtClean="0"/>
+              <a:t>range</a:t>
+            </a:r>
+            <a:r>
+              <a:rPr lang="fi-FI" baseline="0" dirty="0" smtClean="0"/>
+              <a:t> </a:t>
+            </a:r>
+            <a:r>
+              <a:rPr lang="fi-FI" baseline="0" dirty="0" err="1" smtClean="0"/>
+              <a:t>variable</a:t>
+            </a:r>
+            <a:r>
+              <a:rPr lang="fi-FI" baseline="0" dirty="0" smtClean="0"/>
+              <a:t> and </a:t>
+            </a:r>
+            <a:r>
+              <a:rPr lang="fi-FI" baseline="0" dirty="0" err="1" smtClean="0"/>
+              <a:t>the</a:t>
+            </a:r>
+            <a:r>
+              <a:rPr lang="fi-FI" baseline="0" dirty="0" smtClean="0"/>
+              <a:t> </a:t>
+            </a:r>
+            <a:r>
+              <a:rPr lang="fi-FI" baseline="0" dirty="0" err="1" smtClean="0"/>
+              <a:t>heighted</a:t>
+            </a:r>
+            <a:r>
+              <a:rPr lang="fi-FI" baseline="0" dirty="0" smtClean="0"/>
+              <a:t> h it </a:t>
+            </a:r>
+            <a:r>
+              <a:rPr lang="fi-FI" baseline="0" dirty="0" err="1" smtClean="0"/>
+              <a:t>was</a:t>
+            </a:r>
+            <a:r>
+              <a:rPr lang="fi-FI" baseline="0" dirty="0" smtClean="0"/>
+              <a:t> </a:t>
+            </a:r>
+            <a:r>
+              <a:rPr lang="fi-FI" baseline="0" dirty="0" err="1" smtClean="0"/>
+              <a:t>computed</a:t>
+            </a:r>
+            <a:r>
+              <a:rPr lang="fi-FI" baseline="0" dirty="0" smtClean="0"/>
+              <a:t> </a:t>
+            </a:r>
+            <a:r>
+              <a:rPr lang="fi-FI" baseline="0" dirty="0" err="1" smtClean="0"/>
+              <a:t>with</a:t>
+            </a:r>
+            <a:r>
+              <a:rPr lang="fi-FI" baseline="0" dirty="0" smtClean="0"/>
+              <a:t> </a:t>
+            </a:r>
+            <a:r>
+              <a:rPr lang="fi-FI" baseline="0" dirty="0" err="1" smtClean="0"/>
+              <a:t>needs</a:t>
+            </a:r>
+            <a:r>
+              <a:rPr lang="fi-FI" baseline="0" dirty="0" smtClean="0"/>
+              <a:t> to </a:t>
+            </a:r>
+            <a:r>
+              <a:rPr lang="fi-FI" baseline="0" dirty="0" err="1" smtClean="0"/>
+              <a:t>be</a:t>
+            </a:r>
+            <a:r>
+              <a:rPr lang="fi-FI" baseline="0" dirty="0" smtClean="0"/>
+              <a:t> </a:t>
+            </a:r>
+            <a:r>
+              <a:rPr lang="fi-FI" baseline="0" dirty="0" err="1" smtClean="0"/>
+              <a:t>saved</a:t>
+            </a:r>
+            <a:r>
+              <a:rPr lang="fi-FI" baseline="0" dirty="0" smtClean="0"/>
+              <a:t> to </a:t>
+            </a:r>
+            <a:r>
+              <a:rPr lang="fi-FI" baseline="0" dirty="0" err="1" smtClean="0"/>
+              <a:t>the</a:t>
+            </a:r>
+            <a:r>
+              <a:rPr lang="fi-FI" baseline="0" dirty="0" smtClean="0"/>
+              <a:t> </a:t>
+            </a:r>
+            <a:r>
+              <a:rPr lang="fi-FI" baseline="0" dirty="0" err="1" smtClean="0"/>
+              <a:t>Reconstructions</a:t>
+            </a:r>
+            <a:r>
+              <a:rPr lang="fi-FI" baseline="0" dirty="0" smtClean="0"/>
+              <a:t> </a:t>
+            </a:r>
+            <a:r>
+              <a:rPr lang="fi-FI" baseline="0" dirty="0" err="1" smtClean="0"/>
+              <a:t>section</a:t>
+            </a:r>
+            <a:r>
+              <a:rPr lang="fi-FI" baseline="0" dirty="0" smtClean="0"/>
+              <a:t>.</a:t>
+            </a:r>
+          </a:p>
+          <a:p>
+            <a:endParaRPr lang="fi-FI" baseline="0" dirty="0" smtClean="0"/>
+          </a:p>
+          <a:p>
+            <a:r>
+              <a:rPr lang="fi-FI" baseline="0" dirty="0" err="1" smtClean="0"/>
+              <a:t>The</a:t>
+            </a:r>
+            <a:r>
+              <a:rPr lang="fi-FI" baseline="0" dirty="0" smtClean="0"/>
+              <a:t> </a:t>
+            </a:r>
+            <a:r>
+              <a:rPr lang="fi-FI" baseline="0" dirty="0" err="1" smtClean="0"/>
+              <a:t>if-else</a:t>
+            </a:r>
+            <a:r>
+              <a:rPr lang="fi-FI" baseline="0" dirty="0" smtClean="0"/>
+              <a:t> </a:t>
+            </a:r>
+            <a:r>
+              <a:rPr lang="fi-FI" baseline="0" dirty="0" err="1" smtClean="0"/>
+              <a:t>block</a:t>
+            </a:r>
+            <a:r>
+              <a:rPr lang="fi-FI" baseline="0" dirty="0" smtClean="0"/>
+              <a:t> </a:t>
+            </a:r>
+            <a:r>
+              <a:rPr lang="fi-FI" baseline="0" dirty="0" err="1" smtClean="0"/>
+              <a:t>now</a:t>
+            </a:r>
+            <a:r>
+              <a:rPr lang="fi-FI" baseline="0" dirty="0" smtClean="0"/>
+              <a:t> </a:t>
+            </a:r>
+            <a:r>
+              <a:rPr lang="fi-FI" baseline="0" dirty="0" err="1" smtClean="0"/>
+              <a:t>inter-</a:t>
+            </a:r>
+            <a:r>
+              <a:rPr lang="fi-FI" baseline="0" dirty="0" smtClean="0"/>
+              <a:t> and </a:t>
+            </a:r>
+            <a:r>
+              <a:rPr lang="fi-FI" baseline="0" dirty="0" err="1" smtClean="0"/>
+              <a:t>extrapolates</a:t>
+            </a:r>
+            <a:r>
+              <a:rPr lang="fi-FI" baseline="0" dirty="0" smtClean="0"/>
+              <a:t> </a:t>
+            </a:r>
+            <a:r>
+              <a:rPr lang="fi-FI" baseline="0" dirty="0" err="1" smtClean="0"/>
+              <a:t>the</a:t>
+            </a:r>
+            <a:r>
+              <a:rPr lang="fi-FI" baseline="0" dirty="0" smtClean="0"/>
+              <a:t> </a:t>
+            </a:r>
+            <a:r>
+              <a:rPr lang="fi-FI" baseline="0" dirty="0" err="1" smtClean="0"/>
+              <a:t>CoR</a:t>
+            </a:r>
+            <a:r>
+              <a:rPr lang="fi-FI" baseline="0" dirty="0" smtClean="0"/>
+              <a:t> </a:t>
+            </a:r>
+            <a:r>
+              <a:rPr lang="fi-FI" baseline="0" dirty="0" err="1" smtClean="0"/>
+              <a:t>values</a:t>
+            </a:r>
+            <a:r>
+              <a:rPr lang="fi-FI" baseline="0" dirty="0" smtClean="0"/>
+              <a:t> </a:t>
+            </a:r>
+            <a:r>
+              <a:rPr lang="fi-FI" baseline="0" dirty="0" err="1" smtClean="0"/>
+              <a:t>where</a:t>
+            </a:r>
+            <a:r>
+              <a:rPr lang="fi-FI" baseline="0" dirty="0" smtClean="0"/>
+              <a:t> </a:t>
+            </a:r>
+            <a:r>
+              <a:rPr lang="fi-FI" baseline="0" dirty="0" err="1" smtClean="0"/>
+              <a:t>necessary</a:t>
+            </a:r>
+            <a:r>
+              <a:rPr lang="fi-FI" baseline="0" dirty="0" smtClean="0"/>
+              <a:t>.</a:t>
+            </a:r>
+          </a:p>
+          <a:p>
+            <a:endParaRPr lang="fi-FI" baseline="0" dirty="0" smtClean="0"/>
+          </a:p>
+          <a:p>
+            <a:r>
+              <a:rPr lang="fi-FI" baseline="0" dirty="0" smtClean="0"/>
+              <a:t>PLEASE NOTE, THAT FOR THE STABILITY OF THE SOLUTION, CORS SHOULD NEVERTHELESS BE COMPUTED AS FAR APART FROM EACH OTHER AS POSSIBLE. </a:t>
+            </a:r>
+            <a:r>
+              <a:rPr lang="fi-FI" baseline="0" dirty="0" err="1" smtClean="0"/>
+              <a:t>That</a:t>
+            </a:r>
+            <a:r>
+              <a:rPr lang="fi-FI" baseline="0" dirty="0" smtClean="0"/>
+              <a:t> is, </a:t>
+            </a:r>
+            <a:r>
+              <a:rPr lang="fi-FI" baseline="0" dirty="0" err="1" smtClean="0"/>
+              <a:t>from</a:t>
+            </a:r>
+            <a:r>
+              <a:rPr lang="fi-FI" baseline="0" dirty="0" smtClean="0"/>
+              <a:t> as </a:t>
+            </a:r>
+            <a:r>
+              <a:rPr lang="fi-FI" baseline="0" dirty="0" err="1" smtClean="0"/>
+              <a:t>close</a:t>
+            </a:r>
+            <a:r>
+              <a:rPr lang="fi-FI" baseline="0" dirty="0" smtClean="0"/>
+              <a:t> to </a:t>
+            </a:r>
+            <a:r>
+              <a:rPr lang="fi-FI" baseline="0" dirty="0" err="1" smtClean="0"/>
+              <a:t>tob</a:t>
+            </a:r>
+            <a:r>
+              <a:rPr lang="fi-FI" baseline="0" dirty="0" smtClean="0"/>
+              <a:t> and </a:t>
+            </a:r>
+            <a:r>
+              <a:rPr lang="fi-FI" baseline="0" dirty="0" err="1" smtClean="0"/>
+              <a:t>bottom</a:t>
+            </a:r>
+            <a:r>
+              <a:rPr lang="fi-FI" baseline="0" dirty="0" smtClean="0"/>
+              <a:t> as </a:t>
+            </a:r>
+            <a:r>
+              <a:rPr lang="fi-FI" baseline="0" dirty="0" err="1" smtClean="0"/>
+              <a:t>possible</a:t>
+            </a:r>
+            <a:r>
+              <a:rPr lang="fi-FI" baseline="0" dirty="0" smtClean="0"/>
+              <a:t>.</a:t>
+            </a:r>
+            <a:endParaRPr lang="fi-FI" dirty="0" smtClean="0"/>
+          </a:p>
+          <a:p>
+            <a:endParaRPr lang="fi-FI" dirty="0" smtClean="0"/>
+          </a:p>
+          <a:p>
+            <a:r>
+              <a:rPr lang="fi-FI" dirty="0" err="1" smtClean="0"/>
+              <a:t>Otherwise</a:t>
+            </a:r>
+            <a:r>
+              <a:rPr lang="fi-FI" dirty="0" smtClean="0"/>
+              <a:t> </a:t>
+            </a:r>
+            <a:r>
+              <a:rPr lang="fi-FI" dirty="0" err="1" smtClean="0"/>
+              <a:t>the</a:t>
+            </a:r>
+            <a:r>
+              <a:rPr lang="fi-FI" dirty="0" smtClean="0"/>
+              <a:t> </a:t>
+            </a:r>
+            <a:r>
+              <a:rPr lang="fi-FI" dirty="0" err="1" smtClean="0"/>
+              <a:t>code</a:t>
+            </a:r>
+            <a:r>
+              <a:rPr lang="fi-FI" baseline="0" dirty="0" smtClean="0"/>
+              <a:t> </a:t>
+            </a:r>
+            <a:r>
+              <a:rPr lang="fi-FI" baseline="0" dirty="0" err="1" smtClean="0"/>
+              <a:t>works</a:t>
+            </a:r>
+            <a:r>
+              <a:rPr lang="fi-FI" baseline="0" dirty="0" smtClean="0"/>
+              <a:t> </a:t>
+            </a:r>
+            <a:r>
+              <a:rPr lang="fi-FI" baseline="0" dirty="0" err="1" smtClean="0"/>
+              <a:t>the</a:t>
+            </a:r>
+            <a:r>
+              <a:rPr lang="fi-FI" baseline="0" dirty="0" smtClean="0"/>
+              <a:t> </a:t>
+            </a:r>
+            <a:r>
+              <a:rPr lang="fi-FI" baseline="0" dirty="0" err="1" smtClean="0"/>
+              <a:t>same</a:t>
+            </a:r>
+            <a:r>
+              <a:rPr lang="fi-FI" baseline="0" dirty="0" smtClean="0"/>
+              <a:t> as </a:t>
+            </a:r>
+            <a:r>
+              <a:rPr lang="fi-FI" baseline="0" dirty="0" err="1" smtClean="0"/>
+              <a:t>described</a:t>
+            </a:r>
+            <a:r>
+              <a:rPr lang="fi-FI" baseline="0" dirty="0" smtClean="0"/>
+              <a:t> </a:t>
+            </a:r>
+            <a:r>
+              <a:rPr lang="fi-FI" baseline="0" dirty="0" err="1" smtClean="0"/>
+              <a:t>before</a:t>
+            </a:r>
+            <a:r>
+              <a:rPr lang="fi-FI" baseline="0" dirty="0" smtClean="0"/>
+              <a:t>.</a:t>
+            </a:r>
+            <a:endParaRPr lang="fi-FI" dirty="0"/>
+          </a:p>
+        </p:txBody>
+      </p:sp>
+      <p:sp>
+        <p:nvSpPr>
+          <p:cNvPr id="4" name="Slide Number Placeholder 3"/>
+          <p:cNvSpPr>
+            <a:spLocks noGrp="1"/>
+          </p:cNvSpPr>
+          <p:nvPr>
+            <p:ph type="sldNum" sz="quarter" idx="10"/>
+          </p:nvPr>
+        </p:nvSpPr>
+        <p:spPr/>
+        <p:txBody>
+          <a:bodyPr/>
+          <a:lstStyle/>
+          <a:p>
+            <a:fld id="{EF8B366D-2838-4139-871F-B49C13865B24}" type="slidenum">
+              <a:rPr lang="fi-FI" smtClean="0"/>
+              <a:t>11</a:t>
+            </a:fld>
+            <a:endParaRPr lang="fi-FI"/>
+          </a:p>
+        </p:txBody>
+      </p:sp>
+    </p:spTree>
+    <p:extLst>
+      <p:ext uri="{BB962C8B-B14F-4D97-AF65-F5344CB8AC3E}">
+        <p14:creationId xmlns:p14="http://schemas.microsoft.com/office/powerpoint/2010/main" val="3998301624"/>
+      </p:ext>
+    </p:extLst>
+  </p:cSld>
+  <p:clrMapOvr>
+    <a:masterClrMapping/>
+  </p:clrMapOvr>
+</p:notes>
+</file>
+
 <file path=ppt/notesSlides/notesSlide2.xml><?xml version="1.0" encoding="utf-8"?>
 <p:notes xmlns:a="http://schemas.openxmlformats.org/drawingml/2006/main" xmlns:r="http://schemas.openxmlformats.org/officeDocument/2006/relationships" xmlns:p="http://schemas.openxmlformats.org/presentationml/2006/main">
   <p:cSld>
@@ -2523,7 +3010,7 @@
           <a:p>
             <a:fld id="{EAF25924-AE4C-49BB-99C0-09D6869CBDC2}" type="datetimeFigureOut">
               <a:rPr lang="fi-FI" smtClean="0"/>
-              <a:t>20.3.2019</a:t>
+              <a:t>6.6.2019</a:t>
             </a:fld>
             <a:endParaRPr lang="fi-FI"/>
           </a:p>
@@ -2693,7 +3180,7 @@
           <a:p>
             <a:fld id="{EAF25924-AE4C-49BB-99C0-09D6869CBDC2}" type="datetimeFigureOut">
               <a:rPr lang="fi-FI" smtClean="0"/>
-              <a:t>20.3.2019</a:t>
+              <a:t>6.6.2019</a:t>
             </a:fld>
             <a:endParaRPr lang="fi-FI"/>
           </a:p>
@@ -2873,7 +3360,7 @@
           <a:p>
             <a:fld id="{EAF25924-AE4C-49BB-99C0-09D6869CBDC2}" type="datetimeFigureOut">
               <a:rPr lang="fi-FI" smtClean="0"/>
-              <a:t>20.3.2019</a:t>
+              <a:t>6.6.2019</a:t>
             </a:fld>
             <a:endParaRPr lang="fi-FI"/>
           </a:p>
@@ -3043,7 +3530,7 @@
           <a:p>
             <a:fld id="{EAF25924-AE4C-49BB-99C0-09D6869CBDC2}" type="datetimeFigureOut">
               <a:rPr lang="fi-FI" smtClean="0"/>
-              <a:t>20.3.2019</a:t>
+              <a:t>6.6.2019</a:t>
             </a:fld>
             <a:endParaRPr lang="fi-FI"/>
           </a:p>
@@ -3289,7 +3776,7 @@
           <a:p>
             <a:fld id="{EAF25924-AE4C-49BB-99C0-09D6869CBDC2}" type="datetimeFigureOut">
               <a:rPr lang="fi-FI" smtClean="0"/>
-              <a:t>20.3.2019</a:t>
+              <a:t>6.6.2019</a:t>
             </a:fld>
             <a:endParaRPr lang="fi-FI"/>
           </a:p>
@@ -3521,7 +4008,7 @@
           <a:p>
             <a:fld id="{EAF25924-AE4C-49BB-99C0-09D6869CBDC2}" type="datetimeFigureOut">
               <a:rPr lang="fi-FI" smtClean="0"/>
-              <a:t>20.3.2019</a:t>
+              <a:t>6.6.2019</a:t>
             </a:fld>
             <a:endParaRPr lang="fi-FI"/>
           </a:p>
@@ -3888,7 +4375,7 @@
           <a:p>
             <a:fld id="{EAF25924-AE4C-49BB-99C0-09D6869CBDC2}" type="datetimeFigureOut">
               <a:rPr lang="fi-FI" smtClean="0"/>
-              <a:t>20.3.2019</a:t>
+              <a:t>6.6.2019</a:t>
             </a:fld>
             <a:endParaRPr lang="fi-FI"/>
           </a:p>
@@ -4006,7 +4493,7 @@
           <a:p>
             <a:fld id="{EAF25924-AE4C-49BB-99C0-09D6869CBDC2}" type="datetimeFigureOut">
               <a:rPr lang="fi-FI" smtClean="0"/>
-              <a:t>20.3.2019</a:t>
+              <a:t>6.6.2019</a:t>
             </a:fld>
             <a:endParaRPr lang="fi-FI"/>
           </a:p>
@@ -4101,7 +4588,7 @@
           <a:p>
             <a:fld id="{EAF25924-AE4C-49BB-99C0-09D6869CBDC2}" type="datetimeFigureOut">
               <a:rPr lang="fi-FI" smtClean="0"/>
-              <a:t>20.3.2019</a:t>
+              <a:t>6.6.2019</a:t>
             </a:fld>
             <a:endParaRPr lang="fi-FI"/>
           </a:p>
@@ -4378,7 +4865,7 @@
           <a:p>
             <a:fld id="{EAF25924-AE4C-49BB-99C0-09D6869CBDC2}" type="datetimeFigureOut">
               <a:rPr lang="fi-FI" smtClean="0"/>
-              <a:t>20.3.2019</a:t>
+              <a:t>6.6.2019</a:t>
             </a:fld>
             <a:endParaRPr lang="fi-FI"/>
           </a:p>
@@ -4631,7 +5118,7 @@
           <a:p>
             <a:fld id="{EAF25924-AE4C-49BB-99C0-09D6869CBDC2}" type="datetimeFigureOut">
               <a:rPr lang="fi-FI" smtClean="0"/>
-              <a:t>20.3.2019</a:t>
+              <a:t>6.6.2019</a:t>
             </a:fld>
             <a:endParaRPr lang="fi-FI"/>
           </a:p>
@@ -4844,7 +5331,7 @@
           <a:p>
             <a:fld id="{EAF25924-AE4C-49BB-99C0-09D6869CBDC2}" type="datetimeFigureOut">
               <a:rPr lang="fi-FI" smtClean="0"/>
-              <a:t>20.3.2019</a:t>
+              <a:t>6.6.2019</a:t>
             </a:fld>
             <a:endParaRPr lang="fi-FI"/>
           </a:p>
@@ -5405,6 +5892,292 @@
     <p:extLst>
       <p:ext uri="{BB962C8B-B14F-4D97-AF65-F5344CB8AC3E}">
         <p14:creationId xmlns:p14="http://schemas.microsoft.com/office/powerpoint/2010/main" val="1510287627"/>
+      </p:ext>
+    </p:extLst>
+  </p:cSld>
+  <p:clrMapOvr>
+    <a:masterClrMapping/>
+  </p:clrMapOvr>
+</p:sld>
+</file>
+
+<file path=ppt/slides/slide10.xml><?xml version="1.0" encoding="utf-8"?>
+<p:sld xmlns:a="http://schemas.openxmlformats.org/drawingml/2006/main" xmlns:r="http://schemas.openxmlformats.org/officeDocument/2006/relationships" xmlns:p="http://schemas.openxmlformats.org/presentationml/2006/main">
+  <p:cSld>
+    <p:spTree>
+      <p:nvGrpSpPr>
+        <p:cNvPr id="1" name=""/>
+        <p:cNvGrpSpPr/>
+        <p:nvPr/>
+      </p:nvGrpSpPr>
+      <p:grpSpPr>
+        <a:xfrm>
+          <a:off x="0" y="0"/>
+          <a:ext cx="0" cy="0"/>
+          <a:chOff x="0" y="0"/>
+          <a:chExt cx="0" cy="0"/>
+        </a:xfrm>
+      </p:grpSpPr>
+      <p:sp>
+        <p:nvSpPr>
+          <p:cNvPr id="4" name="Title 3"/>
+          <p:cNvSpPr>
+            <a:spLocks noGrp="1"/>
+          </p:cNvSpPr>
+          <p:nvPr>
+            <p:ph type="title"/>
+          </p:nvPr>
+        </p:nvSpPr>
+        <p:spPr/>
+        <p:txBody>
+          <a:bodyPr>
+            <a:normAutofit/>
+          </a:bodyPr>
+          <a:lstStyle/>
+          <a:p>
+            <a:r>
+              <a:rPr lang="fi-FI" dirty="0" err="1" smtClean="0"/>
+              <a:t>Heighted</a:t>
+            </a:r>
+            <a:r>
+              <a:rPr lang="fi-FI" dirty="0" smtClean="0"/>
+              <a:t> </a:t>
+            </a:r>
+            <a:r>
+              <a:rPr lang="fi-FI" dirty="0" err="1" smtClean="0"/>
+              <a:t>CoRs</a:t>
+            </a:r>
+            <a:endParaRPr lang="fi-FI" dirty="0"/>
+          </a:p>
+        </p:txBody>
+      </p:sp>
+      <p:sp>
+        <p:nvSpPr>
+          <p:cNvPr id="6" name="Content Placeholder 5"/>
+          <p:cNvSpPr>
+            <a:spLocks noGrp="1"/>
+          </p:cNvSpPr>
+          <p:nvPr>
+            <p:ph idx="1"/>
+          </p:nvPr>
+        </p:nvSpPr>
+        <p:spPr/>
+        <p:txBody>
+          <a:bodyPr/>
+          <a:lstStyle/>
+          <a:p>
+            <a:r>
+              <a:rPr lang="fi-FI" dirty="0" err="1"/>
+              <a:t>Implementation</a:t>
+            </a:r>
+            <a:r>
+              <a:rPr lang="fi-FI" dirty="0"/>
+              <a:t> </a:t>
+            </a:r>
+            <a:r>
+              <a:rPr lang="fi-FI" dirty="0" err="1"/>
+              <a:t>when</a:t>
+            </a:r>
+            <a:r>
+              <a:rPr lang="fi-FI" dirty="0"/>
+              <a:t> center of </a:t>
+            </a:r>
+            <a:r>
+              <a:rPr lang="fi-FI" dirty="0" err="1"/>
+              <a:t>rotation</a:t>
+            </a:r>
+            <a:r>
+              <a:rPr lang="fi-FI" dirty="0"/>
+              <a:t> offset </a:t>
+            </a:r>
+            <a:r>
+              <a:rPr lang="fi-FI" dirty="0" err="1"/>
+              <a:t>can</a:t>
+            </a:r>
+            <a:r>
+              <a:rPr lang="fi-FI" dirty="0"/>
+              <a:t> </a:t>
+            </a:r>
+            <a:r>
+              <a:rPr lang="fi-FI" dirty="0" err="1"/>
+              <a:t>not</a:t>
+            </a:r>
+            <a:r>
+              <a:rPr lang="fi-FI" dirty="0"/>
+              <a:t> </a:t>
+            </a:r>
+            <a:r>
+              <a:rPr lang="fi-FI" dirty="0" err="1"/>
+              <a:t>be</a:t>
+            </a:r>
+            <a:r>
+              <a:rPr lang="fi-FI" dirty="0"/>
+              <a:t> </a:t>
+            </a:r>
+            <a:r>
+              <a:rPr lang="fi-FI" dirty="0" err="1"/>
+              <a:t>computed</a:t>
+            </a:r>
+            <a:r>
+              <a:rPr lang="fi-FI" dirty="0"/>
+              <a:t> </a:t>
+            </a:r>
+            <a:r>
+              <a:rPr lang="fi-FI" dirty="0" err="1"/>
+              <a:t>from</a:t>
+            </a:r>
+            <a:r>
+              <a:rPr lang="fi-FI" dirty="0"/>
+              <a:t> </a:t>
+            </a:r>
+            <a:r>
+              <a:rPr lang="fi-FI" dirty="0" smtClean="0"/>
+              <a:t>top and </a:t>
+            </a:r>
+            <a:r>
+              <a:rPr lang="fi-FI" dirty="0" err="1" smtClean="0"/>
+              <a:t>bottom</a:t>
+            </a:r>
+            <a:r>
+              <a:rPr lang="fi-FI" dirty="0" smtClean="0"/>
+              <a:t> </a:t>
+            </a:r>
+            <a:r>
+              <a:rPr lang="fi-FI" dirty="0" err="1" smtClean="0"/>
+              <a:t>most</a:t>
+            </a:r>
+            <a:r>
+              <a:rPr lang="fi-FI" dirty="0" smtClean="0"/>
+              <a:t> </a:t>
+            </a:r>
+            <a:r>
+              <a:rPr lang="fi-FI" dirty="0" err="1" smtClean="0"/>
+              <a:t>slices</a:t>
+            </a:r>
+            <a:endParaRPr lang="fi-FI" dirty="0" smtClean="0"/>
+          </a:p>
+          <a:p>
+            <a:r>
+              <a:rPr lang="fi-FI" dirty="0" err="1" smtClean="0">
+                <a:latin typeface="Courier New" panose="02070309020205020404" pitchFamily="49" charset="0"/>
+                <a:cs typeface="Courier New" panose="02070309020205020404" pitchFamily="49" charset="0"/>
+              </a:rPr>
+              <a:t>fbp_w_heighted_cors.m</a:t>
+            </a:r>
+            <a:endParaRPr lang="fi-FI" dirty="0">
+              <a:latin typeface="Courier New" panose="02070309020205020404" pitchFamily="49" charset="0"/>
+              <a:cs typeface="Courier New" panose="02070309020205020404" pitchFamily="49" charset="0"/>
+            </a:endParaRPr>
+          </a:p>
+        </p:txBody>
+      </p:sp>
+    </p:spTree>
+    <p:extLst>
+      <p:ext uri="{BB962C8B-B14F-4D97-AF65-F5344CB8AC3E}">
+        <p14:creationId xmlns:p14="http://schemas.microsoft.com/office/powerpoint/2010/main" val="985569743"/>
+      </p:ext>
+    </p:extLst>
+  </p:cSld>
+  <p:clrMapOvr>
+    <a:masterClrMapping/>
+  </p:clrMapOvr>
+</p:sld>
+</file>
+
+<file path=ppt/slides/slide11.xml><?xml version="1.0" encoding="utf-8"?>
+<p:sld xmlns:a="http://schemas.openxmlformats.org/drawingml/2006/main" xmlns:r="http://schemas.openxmlformats.org/officeDocument/2006/relationships" xmlns:p="http://schemas.openxmlformats.org/presentationml/2006/main">
+  <p:cSld>
+    <p:spTree>
+      <p:nvGrpSpPr>
+        <p:cNvPr id="1" name=""/>
+        <p:cNvGrpSpPr/>
+        <p:nvPr/>
+      </p:nvGrpSpPr>
+      <p:grpSpPr>
+        <a:xfrm>
+          <a:off x="0" y="0"/>
+          <a:ext cx="0" cy="0"/>
+          <a:chOff x="0" y="0"/>
+          <a:chExt cx="0" cy="0"/>
+        </a:xfrm>
+      </p:grpSpPr>
+      <p:sp>
+        <p:nvSpPr>
+          <p:cNvPr id="2" name="Title 1"/>
+          <p:cNvSpPr>
+            <a:spLocks noGrp="1"/>
+          </p:cNvSpPr>
+          <p:nvPr>
+            <p:ph type="title"/>
+          </p:nvPr>
+        </p:nvSpPr>
+        <p:spPr/>
+        <p:txBody>
+          <a:bodyPr/>
+          <a:lstStyle/>
+          <a:p>
+            <a:r>
+              <a:rPr lang="fi-FI" dirty="0" err="1" smtClean="0"/>
+              <a:t>Steps</a:t>
+            </a:r>
+            <a:r>
+              <a:rPr lang="fi-FI" dirty="0" smtClean="0"/>
+              <a:t> 3 b - c</a:t>
+            </a:r>
+            <a:endParaRPr lang="fi-FI" dirty="0"/>
+          </a:p>
+        </p:txBody>
+      </p:sp>
+      <p:pic>
+        <p:nvPicPr>
+          <p:cNvPr id="4" name="Picture 3"/>
+          <p:cNvPicPr>
+            <a:picLocks noChangeAspect="1"/>
+          </p:cNvPicPr>
+          <p:nvPr/>
+        </p:nvPicPr>
+        <p:blipFill rotWithShape="1">
+          <a:blip r:embed="rId3"/>
+          <a:srcRect l="20275" t="68272" r="60047" b="5635"/>
+          <a:stretch/>
+        </p:blipFill>
+        <p:spPr>
+          <a:xfrm>
+            <a:off x="501444" y="2182761"/>
+            <a:ext cx="3598607" cy="2684207"/>
+          </a:xfrm>
+          <a:prstGeom prst="rect">
+            <a:avLst/>
+          </a:prstGeom>
+        </p:spPr>
+      </p:pic>
+      <p:pic>
+        <p:nvPicPr>
+          <p:cNvPr id="5" name="Picture 4"/>
+          <p:cNvPicPr>
+            <a:picLocks noChangeAspect="1"/>
+          </p:cNvPicPr>
+          <p:nvPr/>
+        </p:nvPicPr>
+        <p:blipFill rotWithShape="1">
+          <a:blip r:embed="rId3"/>
+          <a:srcRect l="23602" t="18100" r="45269" b="48925"/>
+          <a:stretch/>
+        </p:blipFill>
+        <p:spPr>
+          <a:xfrm>
+            <a:off x="4925961" y="1828799"/>
+            <a:ext cx="5692878" cy="3392129"/>
+          </a:xfrm>
+          <a:prstGeom prst="rect">
+            <a:avLst/>
+          </a:prstGeom>
+        </p:spPr>
+      </p:pic>
+    </p:spTree>
+    <p:extLst>
+      <p:ext uri="{BB962C8B-B14F-4D97-AF65-F5344CB8AC3E}">
+        <p14:creationId xmlns:p14="http://schemas.microsoft.com/office/powerpoint/2010/main" val="2173133658"/>
       </p:ext>
     </p:extLst>
   </p:cSld>

</xml_diff>

<commit_message>
Updated power point version of manual.
</commit_message>
<xml_diff>
--- a/MATLAB implementation of filtered backprojection reconstruction for optical.pptx
+++ b/MATLAB implementation of filtered backprojection reconstruction for optical.pptx
@@ -21,7 +21,7 @@
     <p:sldId id="265" r:id="rId12"/>
   </p:sldIdLst>
   <p:sldSz cx="12192000" cy="6858000"/>
-  <p:notesSz cx="6858000" cy="9144000"/>
+  <p:notesSz cx="7102475" cy="10234613"/>
   <p:defaultTextStyle>
     <a:defPPr>
       <a:defRPr lang="fi-FI"/>
@@ -160,17 +160,17 @@
         <p:spPr>
           <a:xfrm>
             <a:off x="0" y="0"/>
-            <a:ext cx="2971800" cy="458788"/>
+            <a:ext cx="3077739" cy="513508"/>
           </a:xfrm>
           <a:prstGeom prst="rect">
             <a:avLst/>
           </a:prstGeom>
         </p:spPr>
         <p:txBody>
-          <a:bodyPr vert="horz" lIns="91440" tIns="45720" rIns="91440" bIns="45720" rtlCol="0"/>
+          <a:bodyPr vert="horz" lIns="99066" tIns="49533" rIns="99066" bIns="49533" rtlCol="0"/>
           <a:lstStyle>
             <a:lvl1pPr algn="l">
-              <a:defRPr sz="1200"/>
+              <a:defRPr sz="1300"/>
             </a:lvl1pPr>
           </a:lstStyle>
           <a:p>
@@ -190,18 +190,18 @@
         </p:nvSpPr>
         <p:spPr>
           <a:xfrm>
-            <a:off x="3884613" y="0"/>
-            <a:ext cx="2971800" cy="458788"/>
+            <a:off x="4023092" y="0"/>
+            <a:ext cx="3077739" cy="513508"/>
           </a:xfrm>
           <a:prstGeom prst="rect">
             <a:avLst/>
           </a:prstGeom>
         </p:spPr>
         <p:txBody>
-          <a:bodyPr vert="horz" lIns="91440" tIns="45720" rIns="91440" bIns="45720" rtlCol="0"/>
+          <a:bodyPr vert="horz" lIns="99066" tIns="49533" rIns="99066" bIns="49533" rtlCol="0"/>
           <a:lstStyle>
             <a:lvl1pPr algn="r">
-              <a:defRPr sz="1200"/>
+              <a:defRPr sz="1300"/>
             </a:lvl1pPr>
           </a:lstStyle>
           <a:p>
@@ -225,8 +225,8 @@
         </p:nvSpPr>
         <p:spPr>
           <a:xfrm>
-            <a:off x="685800" y="1143000"/>
-            <a:ext cx="5486400" cy="3086100"/>
+            <a:off x="481013" y="1279525"/>
+            <a:ext cx="6140450" cy="3454400"/>
           </a:xfrm>
           <a:prstGeom prst="rect">
             <a:avLst/>
@@ -239,7 +239,7 @@
           </a:ln>
         </p:spPr>
         <p:txBody>
-          <a:bodyPr vert="horz" lIns="91440" tIns="45720" rIns="91440" bIns="45720" rtlCol="0" anchor="ctr"/>
+          <a:bodyPr vert="horz" lIns="99066" tIns="49533" rIns="99066" bIns="49533" rtlCol="0" anchor="ctr"/>
           <a:lstStyle/>
           <a:p>
             <a:endParaRPr lang="fi-FI"/>
@@ -258,15 +258,15 @@
         </p:nvSpPr>
         <p:spPr>
           <a:xfrm>
-            <a:off x="685800" y="4400550"/>
-            <a:ext cx="5486400" cy="3600450"/>
+            <a:off x="710248" y="4925407"/>
+            <a:ext cx="5681980" cy="4029879"/>
           </a:xfrm>
           <a:prstGeom prst="rect">
             <a:avLst/>
           </a:prstGeom>
         </p:spPr>
         <p:txBody>
-          <a:bodyPr vert="horz" lIns="91440" tIns="45720" rIns="91440" bIns="45720" rtlCol="0"/>
+          <a:bodyPr vert="horz" lIns="99066" tIns="49533" rIns="99066" bIns="49533" rtlCol="0"/>
           <a:lstStyle/>
           <a:p>
             <a:pPr lvl="0"/>
@@ -318,18 +318,18 @@
         </p:nvSpPr>
         <p:spPr>
           <a:xfrm>
-            <a:off x="0" y="8685213"/>
-            <a:ext cx="2971800" cy="458787"/>
+            <a:off x="0" y="9721107"/>
+            <a:ext cx="3077739" cy="513507"/>
           </a:xfrm>
           <a:prstGeom prst="rect">
             <a:avLst/>
           </a:prstGeom>
         </p:spPr>
         <p:txBody>
-          <a:bodyPr vert="horz" lIns="91440" tIns="45720" rIns="91440" bIns="45720" rtlCol="0" anchor="b"/>
+          <a:bodyPr vert="horz" lIns="99066" tIns="49533" rIns="99066" bIns="49533" rtlCol="0" anchor="b"/>
           <a:lstStyle>
             <a:lvl1pPr algn="l">
-              <a:defRPr sz="1200"/>
+              <a:defRPr sz="1300"/>
             </a:lvl1pPr>
           </a:lstStyle>
           <a:p>
@@ -349,18 +349,18 @@
         </p:nvSpPr>
         <p:spPr>
           <a:xfrm>
-            <a:off x="3884613" y="8685213"/>
-            <a:ext cx="2971800" cy="458787"/>
+            <a:off x="4023092" y="9721107"/>
+            <a:ext cx="3077739" cy="513507"/>
           </a:xfrm>
           <a:prstGeom prst="rect">
             <a:avLst/>
           </a:prstGeom>
         </p:spPr>
         <p:txBody>
-          <a:bodyPr vert="horz" lIns="91440" tIns="45720" rIns="91440" bIns="45720" rtlCol="0" anchor="b"/>
+          <a:bodyPr vert="horz" lIns="99066" tIns="49533" rIns="99066" bIns="49533" rtlCol="0" anchor="b"/>
           <a:lstStyle>
             <a:lvl1pPr algn="r">
-              <a:defRPr sz="1200"/>
+              <a:defRPr sz="1300"/>
             </a:lvl1pPr>
           </a:lstStyle>
           <a:p>
@@ -560,6 +560,90 @@
 </file>
 
 <file path=ppt/notesSlides/notesSlide10.xml><?xml version="1.0" encoding="utf-8"?>
+<p:notes xmlns:a="http://schemas.openxmlformats.org/drawingml/2006/main" xmlns:r="http://schemas.openxmlformats.org/officeDocument/2006/relationships" xmlns:p="http://schemas.openxmlformats.org/presentationml/2006/main">
+  <p:cSld>
+    <p:spTree>
+      <p:nvGrpSpPr>
+        <p:cNvPr id="1" name=""/>
+        <p:cNvGrpSpPr/>
+        <p:nvPr/>
+      </p:nvGrpSpPr>
+      <p:grpSpPr>
+        <a:xfrm>
+          <a:off x="0" y="0"/>
+          <a:ext cx="0" cy="0"/>
+          <a:chOff x="0" y="0"/>
+          <a:chExt cx="0" cy="0"/>
+        </a:xfrm>
+      </p:grpSpPr>
+      <p:sp>
+        <p:nvSpPr>
+          <p:cNvPr id="2" name="Slide Image Placeholder 1"/>
+          <p:cNvSpPr>
+            <a:spLocks noGrp="1" noRot="1" noChangeAspect="1"/>
+          </p:cNvSpPr>
+          <p:nvPr>
+            <p:ph type="sldImg"/>
+          </p:nvPr>
+        </p:nvSpPr>
+        <p:spPr/>
+      </p:sp>
+      <p:sp>
+        <p:nvSpPr>
+          <p:cNvPr id="3" name="Notes Placeholder 2"/>
+          <p:cNvSpPr>
+            <a:spLocks noGrp="1"/>
+          </p:cNvSpPr>
+          <p:nvPr>
+            <p:ph type="body" idx="1"/>
+          </p:nvPr>
+        </p:nvSpPr>
+        <p:spPr/>
+        <p:txBody>
+          <a:bodyPr/>
+          <a:lstStyle/>
+          <a:p>
+            <a:endParaRPr lang="fi-FI"/>
+          </a:p>
+        </p:txBody>
+      </p:sp>
+      <p:sp>
+        <p:nvSpPr>
+          <p:cNvPr id="4" name="Slide Number Placeholder 3"/>
+          <p:cNvSpPr>
+            <a:spLocks noGrp="1"/>
+          </p:cNvSpPr>
+          <p:nvPr>
+            <p:ph type="sldNum" sz="quarter" idx="10"/>
+          </p:nvPr>
+        </p:nvSpPr>
+        <p:spPr/>
+        <p:txBody>
+          <a:bodyPr/>
+          <a:lstStyle/>
+          <a:p>
+            <a:fld id="{EF8B366D-2838-4139-871F-B49C13865B24}" type="slidenum">
+              <a:rPr lang="fi-FI" smtClean="0"/>
+              <a:t>10</a:t>
+            </a:fld>
+            <a:endParaRPr lang="fi-FI"/>
+          </a:p>
+        </p:txBody>
+      </p:sp>
+    </p:spTree>
+    <p:extLst>
+      <p:ext uri="{BB962C8B-B14F-4D97-AF65-F5344CB8AC3E}">
+        <p14:creationId xmlns:p14="http://schemas.microsoft.com/office/powerpoint/2010/main" val="791211349"/>
+      </p:ext>
+    </p:extLst>
+  </p:cSld>
+  <p:clrMapOvr>
+    <a:masterClrMapping/>
+  </p:clrMapOvr>
+</p:notes>
+</file>
+
+<file path=ppt/notesSlides/notesSlide11.xml><?xml version="1.0" encoding="utf-8"?>
 <p:notes xmlns:a="http://schemas.openxmlformats.org/drawingml/2006/main" xmlns:r="http://schemas.openxmlformats.org/officeDocument/2006/relationships" xmlns:p="http://schemas.openxmlformats.org/presentationml/2006/main">
   <p:cSld>
     <p:spTree>
@@ -6137,8 +6221,14 @@
           <p:nvPr/>
         </p:nvPicPr>
         <p:blipFill rotWithShape="1">
-          <a:blip r:embed="rId3"/>
-          <a:srcRect l="20275" t="68272" r="60047" b="5635"/>
+          <a:blip r:embed="rId3" cstate="email">
+            <a:extLst>
+              <a:ext uri="{28A0092B-C50C-407E-A947-70E740481C1C}">
+                <a14:useLocalDpi xmlns:a14="http://schemas.microsoft.com/office/drawing/2010/main"/>
+              </a:ext>
+            </a:extLst>
+          </a:blip>
+          <a:srcRect/>
           <a:stretch/>
         </p:blipFill>
         <p:spPr>
@@ -6160,8 +6250,14 @@
           <p:nvPr/>
         </p:nvPicPr>
         <p:blipFill rotWithShape="1">
-          <a:blip r:embed="rId3"/>
-          <a:srcRect l="23602" t="18100" r="45269" b="48925"/>
+          <a:blip r:embed="rId4" cstate="email">
+            <a:extLst>
+              <a:ext uri="{28A0092B-C50C-407E-A947-70E740481C1C}">
+                <a14:useLocalDpi xmlns:a14="http://schemas.microsoft.com/office/drawing/2010/main"/>
+              </a:ext>
+            </a:extLst>
+          </a:blip>
+          <a:srcRect/>
           <a:stretch/>
         </p:blipFill>
         <p:spPr>

</xml_diff>